<commit_message>
Adelantos poster y presentación final
</commit_message>
<xml_diff>
--- a/docs/Plantilla Póster Proyectos y Prototipos Ingeniería.pptx
+++ b/docs/Plantilla Póster Proyectos y Prototipos Ingeniería.pptx
@@ -304,7 +304,7 @@
           <a:p>
             <a:fld id="{72DF6AA1-5D94-4102-AEB6-7EC5D7BB0B2D}" type="datetimeFigureOut">
               <a:rPr lang="es-CO" smtClean="0"/>
-              <a:t>18/08/2021</a:t>
+              <a:t>19/08/2021</a:t>
             </a:fld>
             <a:endParaRPr lang="es-CO"/>
           </a:p>
@@ -474,7 +474,7 @@
           <a:p>
             <a:fld id="{72DF6AA1-5D94-4102-AEB6-7EC5D7BB0B2D}" type="datetimeFigureOut">
               <a:rPr lang="es-CO" smtClean="0"/>
-              <a:t>18/08/2021</a:t>
+              <a:t>19/08/2021</a:t>
             </a:fld>
             <a:endParaRPr lang="es-CO"/>
           </a:p>
@@ -654,7 +654,7 @@
           <a:p>
             <a:fld id="{72DF6AA1-5D94-4102-AEB6-7EC5D7BB0B2D}" type="datetimeFigureOut">
               <a:rPr lang="es-CO" smtClean="0"/>
-              <a:t>18/08/2021</a:t>
+              <a:t>19/08/2021</a:t>
             </a:fld>
             <a:endParaRPr lang="es-CO"/>
           </a:p>
@@ -824,7 +824,7 @@
           <a:p>
             <a:fld id="{72DF6AA1-5D94-4102-AEB6-7EC5D7BB0B2D}" type="datetimeFigureOut">
               <a:rPr lang="es-CO" smtClean="0"/>
-              <a:t>18/08/2021</a:t>
+              <a:t>19/08/2021</a:t>
             </a:fld>
             <a:endParaRPr lang="es-CO"/>
           </a:p>
@@ -1068,7 +1068,7 @@
           <a:p>
             <a:fld id="{72DF6AA1-5D94-4102-AEB6-7EC5D7BB0B2D}" type="datetimeFigureOut">
               <a:rPr lang="es-CO" smtClean="0"/>
-              <a:t>18/08/2021</a:t>
+              <a:t>19/08/2021</a:t>
             </a:fld>
             <a:endParaRPr lang="es-CO"/>
           </a:p>
@@ -1300,7 +1300,7 @@
           <a:p>
             <a:fld id="{72DF6AA1-5D94-4102-AEB6-7EC5D7BB0B2D}" type="datetimeFigureOut">
               <a:rPr lang="es-CO" smtClean="0"/>
-              <a:t>18/08/2021</a:t>
+              <a:t>19/08/2021</a:t>
             </a:fld>
             <a:endParaRPr lang="es-CO"/>
           </a:p>
@@ -1667,7 +1667,7 @@
           <a:p>
             <a:fld id="{72DF6AA1-5D94-4102-AEB6-7EC5D7BB0B2D}" type="datetimeFigureOut">
               <a:rPr lang="es-CO" smtClean="0"/>
-              <a:t>18/08/2021</a:t>
+              <a:t>19/08/2021</a:t>
             </a:fld>
             <a:endParaRPr lang="es-CO"/>
           </a:p>
@@ -1785,7 +1785,7 @@
           <a:p>
             <a:fld id="{72DF6AA1-5D94-4102-AEB6-7EC5D7BB0B2D}" type="datetimeFigureOut">
               <a:rPr lang="es-CO" smtClean="0"/>
-              <a:t>18/08/2021</a:t>
+              <a:t>19/08/2021</a:t>
             </a:fld>
             <a:endParaRPr lang="es-CO"/>
           </a:p>
@@ -1880,7 +1880,7 @@
           <a:p>
             <a:fld id="{72DF6AA1-5D94-4102-AEB6-7EC5D7BB0B2D}" type="datetimeFigureOut">
               <a:rPr lang="es-CO" smtClean="0"/>
-              <a:t>18/08/2021</a:t>
+              <a:t>19/08/2021</a:t>
             </a:fld>
             <a:endParaRPr lang="es-CO"/>
           </a:p>
@@ -2157,7 +2157,7 @@
           <a:p>
             <a:fld id="{72DF6AA1-5D94-4102-AEB6-7EC5D7BB0B2D}" type="datetimeFigureOut">
               <a:rPr lang="es-CO" smtClean="0"/>
-              <a:t>18/08/2021</a:t>
+              <a:t>19/08/2021</a:t>
             </a:fld>
             <a:endParaRPr lang="es-CO"/>
           </a:p>
@@ -2414,7 +2414,7 @@
           <a:p>
             <a:fld id="{72DF6AA1-5D94-4102-AEB6-7EC5D7BB0B2D}" type="datetimeFigureOut">
               <a:rPr lang="es-CO" smtClean="0"/>
-              <a:t>18/08/2021</a:t>
+              <a:t>19/08/2021</a:t>
             </a:fld>
             <a:endParaRPr lang="es-CO"/>
           </a:p>
@@ -2627,7 +2627,7 @@
           <a:p>
             <a:fld id="{72DF6AA1-5D94-4102-AEB6-7EC5D7BB0B2D}" type="datetimeFigureOut">
               <a:rPr lang="es-CO" smtClean="0"/>
-              <a:t>18/08/2021</a:t>
+              <a:t>19/08/2021</a:t>
             </a:fld>
             <a:endParaRPr lang="es-CO"/>
           </a:p>
@@ -4080,7 +4080,7 @@
               <a:rPr lang="es-MX" sz="2800" dirty="0">
                 <a:latin typeface="Ancizar Sans" panose="020B0602040300000003"/>
               </a:rPr>
-              <a:t>Administración de Datos</a:t>
+              <a:t>Administración de datos</a:t>
             </a:r>
             <a:endParaRPr lang="es-CO" sz="2800" dirty="0">
               <a:latin typeface="Ancizar Sans" panose="020B0602040300000003"/>
@@ -4388,6 +4388,445 @@
               </a:rPr>
               <a:t>Funcionalidades</a:t>
             </a:r>
+          </a:p>
+        </p:txBody>
+      </p:sp>
+      <p:pic>
+        <p:nvPicPr>
+          <p:cNvPr id="33" name="Imagen 32">
+            <a:extLst>
+              <a:ext uri="{FF2B5EF4-FFF2-40B4-BE49-F238E27FC236}">
+                <a16:creationId xmlns:a16="http://schemas.microsoft.com/office/drawing/2014/main" id="{66C28A61-A241-4AA2-8CC4-EAFF7661BB14}"/>
+              </a:ext>
+            </a:extLst>
+          </p:cNvPr>
+          <p:cNvPicPr>
+            <a:picLocks noChangeAspect="1"/>
+          </p:cNvPicPr>
+          <p:nvPr/>
+        </p:nvPicPr>
+        <p:blipFill>
+          <a:blip r:embed="rId3"/>
+          <a:stretch>
+            <a:fillRect/>
+          </a:stretch>
+        </p:blipFill>
+        <p:spPr>
+          <a:xfrm>
+            <a:off x="24953202" y="6650428"/>
+            <a:ext cx="5637666" cy="790575"/>
+          </a:xfrm>
+          <a:prstGeom prst="rect">
+            <a:avLst/>
+          </a:prstGeom>
+        </p:spPr>
+      </p:pic>
+      <p:sp>
+        <p:nvSpPr>
+          <p:cNvPr id="34" name="CuadroTexto 33">
+            <a:extLst>
+              <a:ext uri="{FF2B5EF4-FFF2-40B4-BE49-F238E27FC236}">
+                <a16:creationId xmlns:a16="http://schemas.microsoft.com/office/drawing/2014/main" id="{C661F05F-8976-4A62-B937-E2B7AF794615}"/>
+              </a:ext>
+            </a:extLst>
+          </p:cNvPr>
+          <p:cNvSpPr txBox="1"/>
+          <p:nvPr/>
+        </p:nvSpPr>
+        <p:spPr>
+          <a:xfrm>
+            <a:off x="24953202" y="8033656"/>
+            <a:ext cx="10185315" cy="2062103"/>
+          </a:xfrm>
+          <a:prstGeom prst="rect">
+            <a:avLst/>
+          </a:prstGeom>
+          <a:noFill/>
+        </p:spPr>
+        <p:txBody>
+          <a:bodyPr wrap="square" rtlCol="0">
+            <a:spAutoFit/>
+          </a:bodyPr>
+          <a:lstStyle/>
+          <a:p>
+            <a:pPr algn="just"/>
+            <a:r>
+              <a:rPr lang="es-MX" sz="3200" dirty="0">
+                <a:latin typeface="Ancizar Sans" panose="020B0602040300000003"/>
+              </a:rPr>
+              <a:t>La solución fue implementada en el lenguaje de programación Java, con una estructura basada en el paradigma POO, haciendo uso de Git y un repositorio en GitHub para el control de versiones.</a:t>
+            </a:r>
+            <a:endParaRPr lang="es-CO" sz="3200" dirty="0">
+              <a:latin typeface="Ancizar Sans" panose="020B0602040300000003"/>
+            </a:endParaRPr>
+          </a:p>
+        </p:txBody>
+      </p:sp>
+      <p:sp>
+        <p:nvSpPr>
+          <p:cNvPr id="35" name="CuadroTexto 34">
+            <a:extLst>
+              <a:ext uri="{FF2B5EF4-FFF2-40B4-BE49-F238E27FC236}">
+                <a16:creationId xmlns:a16="http://schemas.microsoft.com/office/drawing/2014/main" id="{D06DF15E-018F-4E9C-8CA0-3A4E1CB97B53}"/>
+              </a:ext>
+            </a:extLst>
+          </p:cNvPr>
+          <p:cNvSpPr txBox="1"/>
+          <p:nvPr/>
+        </p:nvSpPr>
+        <p:spPr>
+          <a:xfrm>
+            <a:off x="26479500" y="6715535"/>
+            <a:ext cx="3832535" cy="707886"/>
+          </a:xfrm>
+          <a:prstGeom prst="rect">
+            <a:avLst/>
+          </a:prstGeom>
+          <a:noFill/>
+        </p:spPr>
+        <p:txBody>
+          <a:bodyPr wrap="square" rtlCol="0">
+            <a:spAutoFit/>
+          </a:bodyPr>
+          <a:lstStyle/>
+          <a:p>
+            <a:r>
+              <a:rPr lang="es-MX" sz="4000" b="1" dirty="0">
+                <a:solidFill>
+                  <a:schemeClr val="bg1"/>
+                </a:solidFill>
+                <a:latin typeface="Ancizar Sans" panose="020B0602040300000003" pitchFamily="34" charset="0"/>
+              </a:rPr>
+              <a:t>Implementación</a:t>
+            </a:r>
+          </a:p>
+        </p:txBody>
+      </p:sp>
+      <p:pic>
+        <p:nvPicPr>
+          <p:cNvPr id="39" name="Imagen 38">
+            <a:extLst>
+              <a:ext uri="{FF2B5EF4-FFF2-40B4-BE49-F238E27FC236}">
+                <a16:creationId xmlns:a16="http://schemas.microsoft.com/office/drawing/2014/main" id="{119C2289-7384-4E7E-9E86-83A846803585}"/>
+              </a:ext>
+            </a:extLst>
+          </p:cNvPr>
+          <p:cNvPicPr>
+            <a:picLocks noChangeAspect="1"/>
+          </p:cNvPicPr>
+          <p:nvPr/>
+        </p:nvPicPr>
+        <p:blipFill>
+          <a:blip r:embed="rId3"/>
+          <a:stretch>
+            <a:fillRect/>
+          </a:stretch>
+        </p:blipFill>
+        <p:spPr>
+          <a:xfrm>
+            <a:off x="24974721" y="12353065"/>
+            <a:ext cx="5637666" cy="790575"/>
+          </a:xfrm>
+          <a:prstGeom prst="rect">
+            <a:avLst/>
+          </a:prstGeom>
+        </p:spPr>
+      </p:pic>
+      <p:sp>
+        <p:nvSpPr>
+          <p:cNvPr id="40" name="CuadroTexto 39">
+            <a:extLst>
+              <a:ext uri="{FF2B5EF4-FFF2-40B4-BE49-F238E27FC236}">
+                <a16:creationId xmlns:a16="http://schemas.microsoft.com/office/drawing/2014/main" id="{837045D2-2378-4071-A3B2-83485BEB26CE}"/>
+              </a:ext>
+            </a:extLst>
+          </p:cNvPr>
+          <p:cNvSpPr txBox="1"/>
+          <p:nvPr/>
+        </p:nvSpPr>
+        <p:spPr>
+          <a:xfrm>
+            <a:off x="24974721" y="13448758"/>
+            <a:ext cx="10185315" cy="3539430"/>
+          </a:xfrm>
+          <a:prstGeom prst="rect">
+            <a:avLst/>
+          </a:prstGeom>
+          <a:noFill/>
+        </p:spPr>
+        <p:txBody>
+          <a:bodyPr wrap="square" rtlCol="0">
+            <a:spAutoFit/>
+          </a:bodyPr>
+          <a:lstStyle/>
+          <a:p>
+            <a:pPr algn="just"/>
+            <a:r>
+              <a:rPr lang="es-MX" sz="3200" dirty="0">
+                <a:latin typeface="Ancizar Sans" panose="020B0602040300000003"/>
+              </a:rPr>
+              <a:t>El prototipo final del software cuenta con las funcionalidades anteriores listadas y una interfaz grafica sencilla  que permite el acceso a las mismas. El almacenamiento se realiza en tiempo de ejecución y el procesamiento de los datos es bastante eficiente gracias a las distintas estructuras de datos implementadas, de las cuales se destacan tablas hash, arboles AVL y </a:t>
+            </a:r>
+            <a:r>
+              <a:rPr lang="es-MX" sz="3200" dirty="0" err="1">
+                <a:latin typeface="Ancizar Sans" panose="020B0602040300000003"/>
+              </a:rPr>
+              <a:t>heaps</a:t>
+            </a:r>
+            <a:r>
+              <a:rPr lang="es-MX" sz="3200" dirty="0">
+                <a:latin typeface="Ancizar Sans" panose="020B0602040300000003"/>
+              </a:rPr>
+              <a:t>.  </a:t>
+            </a:r>
+            <a:endParaRPr lang="es-CO" sz="3200" dirty="0">
+              <a:latin typeface="Ancizar Sans" panose="020B0602040300000003"/>
+            </a:endParaRPr>
+          </a:p>
+        </p:txBody>
+      </p:sp>
+      <p:sp>
+        <p:nvSpPr>
+          <p:cNvPr id="41" name="CuadroTexto 40">
+            <a:extLst>
+              <a:ext uri="{FF2B5EF4-FFF2-40B4-BE49-F238E27FC236}">
+                <a16:creationId xmlns:a16="http://schemas.microsoft.com/office/drawing/2014/main" id="{00A7570C-BF1F-499C-A45D-2AE6C75C31CD}"/>
+              </a:ext>
+            </a:extLst>
+          </p:cNvPr>
+          <p:cNvSpPr txBox="1"/>
+          <p:nvPr/>
+        </p:nvSpPr>
+        <p:spPr>
+          <a:xfrm>
+            <a:off x="27793554" y="12423584"/>
+            <a:ext cx="2540000" cy="707886"/>
+          </a:xfrm>
+          <a:prstGeom prst="rect">
+            <a:avLst/>
+          </a:prstGeom>
+          <a:noFill/>
+        </p:spPr>
+        <p:txBody>
+          <a:bodyPr wrap="square" rtlCol="0">
+            <a:spAutoFit/>
+          </a:bodyPr>
+          <a:lstStyle/>
+          <a:p>
+            <a:r>
+              <a:rPr lang="es-MX" sz="4000" b="1" dirty="0">
+                <a:solidFill>
+                  <a:schemeClr val="bg1"/>
+                </a:solidFill>
+                <a:latin typeface="Ancizar Sans" panose="020B0602040300000003" pitchFamily="34" charset="0"/>
+              </a:rPr>
+              <a:t>Resultados</a:t>
+            </a:r>
+          </a:p>
+        </p:txBody>
+      </p:sp>
+      <p:pic>
+        <p:nvPicPr>
+          <p:cNvPr id="1026" name="Picture 2" descr="Cómo actualizar Java en tu ordenador">
+            <a:extLst>
+              <a:ext uri="{FF2B5EF4-FFF2-40B4-BE49-F238E27FC236}">
+                <a16:creationId xmlns:a16="http://schemas.microsoft.com/office/drawing/2014/main" id="{C8938504-69D7-4E61-BF54-6FBEF720519E}"/>
+              </a:ext>
+            </a:extLst>
+          </p:cNvPr>
+          <p:cNvPicPr>
+            <a:picLocks noChangeAspect="1" noChangeArrowheads="1"/>
+          </p:cNvPicPr>
+          <p:nvPr/>
+        </p:nvPicPr>
+        <p:blipFill>
+          <a:blip r:embed="rId6">
+            <a:extLst>
+              <a:ext uri="{28A0092B-C50C-407E-A947-70E740481C1C}">
+                <a14:useLocalDpi xmlns:a14="http://schemas.microsoft.com/office/drawing/2010/main" val="0"/>
+              </a:ext>
+            </a:extLst>
+          </a:blip>
+          <a:srcRect/>
+          <a:stretch>
+            <a:fillRect/>
+          </a:stretch>
+        </p:blipFill>
+        <p:spPr bwMode="auto">
+          <a:xfrm>
+            <a:off x="24974721" y="10562424"/>
+            <a:ext cx="3467100" cy="1323975"/>
+          </a:xfrm>
+          <a:prstGeom prst="rect">
+            <a:avLst/>
+          </a:prstGeom>
+          <a:noFill/>
+          <a:extLst>
+            <a:ext uri="{909E8E84-426E-40DD-AFC4-6F175D3DCCD1}">
+              <a14:hiddenFill xmlns:a14="http://schemas.microsoft.com/office/drawing/2010/main">
+                <a:solidFill>
+                  <a:srgbClr val="FFFFFF"/>
+                </a:solidFill>
+              </a14:hiddenFill>
+            </a:ext>
+          </a:extLst>
+        </p:spPr>
+      </p:pic>
+      <p:pic>
+        <p:nvPicPr>
+          <p:cNvPr id="1028" name="Picture 4" descr="Utilizan la infraestructura de GitHub para minar criptomonedas - Una al Día">
+            <a:extLst>
+              <a:ext uri="{FF2B5EF4-FFF2-40B4-BE49-F238E27FC236}">
+                <a16:creationId xmlns:a16="http://schemas.microsoft.com/office/drawing/2014/main" id="{7433FC99-57C8-40B4-ABBD-0E53801812F4}"/>
+              </a:ext>
+            </a:extLst>
+          </p:cNvPr>
+          <p:cNvPicPr>
+            <a:picLocks noChangeAspect="1" noChangeArrowheads="1"/>
+          </p:cNvPicPr>
+          <p:nvPr/>
+        </p:nvPicPr>
+        <p:blipFill>
+          <a:blip r:embed="rId7">
+            <a:extLst>
+              <a:ext uri="{28A0092B-C50C-407E-A947-70E740481C1C}">
+                <a14:useLocalDpi xmlns:a14="http://schemas.microsoft.com/office/drawing/2010/main" val="0"/>
+              </a:ext>
+            </a:extLst>
+          </a:blip>
+          <a:srcRect/>
+          <a:stretch>
+            <a:fillRect/>
+          </a:stretch>
+        </p:blipFill>
+        <p:spPr bwMode="auto">
+          <a:xfrm>
+            <a:off x="30612387" y="10576451"/>
+            <a:ext cx="3362325" cy="1362075"/>
+          </a:xfrm>
+          <a:prstGeom prst="rect">
+            <a:avLst/>
+          </a:prstGeom>
+          <a:noFill/>
+          <a:extLst>
+            <a:ext uri="{909E8E84-426E-40DD-AFC4-6F175D3DCCD1}">
+              <a14:hiddenFill xmlns:a14="http://schemas.microsoft.com/office/drawing/2010/main">
+                <a:solidFill>
+                  <a:srgbClr val="FFFFFF"/>
+                </a:solidFill>
+              </a14:hiddenFill>
+            </a:ext>
+          </a:extLst>
+        </p:spPr>
+      </p:pic>
+      <p:pic>
+        <p:nvPicPr>
+          <p:cNvPr id="42" name="Imagen 41">
+            <a:extLst>
+              <a:ext uri="{FF2B5EF4-FFF2-40B4-BE49-F238E27FC236}">
+                <a16:creationId xmlns:a16="http://schemas.microsoft.com/office/drawing/2014/main" id="{373148F8-E127-4E03-8B80-D24C9364DB15}"/>
+              </a:ext>
+            </a:extLst>
+          </p:cNvPr>
+          <p:cNvPicPr>
+            <a:picLocks noChangeAspect="1"/>
+          </p:cNvPicPr>
+          <p:nvPr/>
+        </p:nvPicPr>
+        <p:blipFill>
+          <a:blip r:embed="rId3"/>
+          <a:stretch>
+            <a:fillRect/>
+          </a:stretch>
+        </p:blipFill>
+        <p:spPr>
+          <a:xfrm>
+            <a:off x="24974721" y="17519037"/>
+            <a:ext cx="5637666" cy="790575"/>
+          </a:xfrm>
+          <a:prstGeom prst="rect">
+            <a:avLst/>
+          </a:prstGeom>
+        </p:spPr>
+      </p:pic>
+      <p:sp>
+        <p:nvSpPr>
+          <p:cNvPr id="44" name="CuadroTexto 43">
+            <a:extLst>
+              <a:ext uri="{FF2B5EF4-FFF2-40B4-BE49-F238E27FC236}">
+                <a16:creationId xmlns:a16="http://schemas.microsoft.com/office/drawing/2014/main" id="{1F83B4C1-1C99-4D0A-96CB-F6E32B0ABF70}"/>
+              </a:ext>
+            </a:extLst>
+          </p:cNvPr>
+          <p:cNvSpPr txBox="1"/>
+          <p:nvPr/>
+        </p:nvSpPr>
+        <p:spPr>
+          <a:xfrm>
+            <a:off x="27317700" y="17589556"/>
+            <a:ext cx="3015854" cy="707886"/>
+          </a:xfrm>
+          <a:prstGeom prst="rect">
+            <a:avLst/>
+          </a:prstGeom>
+          <a:noFill/>
+        </p:spPr>
+        <p:txBody>
+          <a:bodyPr wrap="square" rtlCol="0">
+            <a:spAutoFit/>
+          </a:bodyPr>
+          <a:lstStyle/>
+          <a:p>
+            <a:r>
+              <a:rPr lang="es-MX" sz="4000" b="1" dirty="0">
+                <a:solidFill>
+                  <a:schemeClr val="bg1"/>
+                </a:solidFill>
+                <a:latin typeface="Ancizar Sans" panose="020B0602040300000003" pitchFamily="34" charset="0"/>
+              </a:rPr>
+              <a:t>Conclusiones</a:t>
+            </a:r>
+          </a:p>
+        </p:txBody>
+      </p:sp>
+      <p:sp>
+        <p:nvSpPr>
+          <p:cNvPr id="45" name="CuadroTexto 44">
+            <a:extLst>
+              <a:ext uri="{FF2B5EF4-FFF2-40B4-BE49-F238E27FC236}">
+                <a16:creationId xmlns:a16="http://schemas.microsoft.com/office/drawing/2014/main" id="{FD7D7364-254B-4A10-8AF2-AD581D921F67}"/>
+              </a:ext>
+            </a:extLst>
+          </p:cNvPr>
+          <p:cNvSpPr txBox="1"/>
+          <p:nvPr/>
+        </p:nvSpPr>
+        <p:spPr>
+          <a:xfrm>
+            <a:off x="24953201" y="18732587"/>
+            <a:ext cx="10185315" cy="2554545"/>
+          </a:xfrm>
+          <a:prstGeom prst="rect">
+            <a:avLst/>
+          </a:prstGeom>
+          <a:noFill/>
+        </p:spPr>
+        <p:txBody>
+          <a:bodyPr wrap="square" rtlCol="0">
+            <a:spAutoFit/>
+          </a:bodyPr>
+          <a:lstStyle/>
+          <a:p>
+            <a:pPr algn="just"/>
+            <a:r>
+              <a:rPr lang="es-MX" sz="3200" dirty="0">
+                <a:latin typeface="Ancizar Sans" panose="020B0602040300000003"/>
+              </a:rPr>
+              <a:t>La solución propuesta resulta ser un buen aporte para la optimización y automatización de los procesos burocráticos detrás de las estrategias de vacunación llevadas a cabo por el gobierno de Colombia, permitiendo así una mejor respuesta ante la crisis sanitaria de la actualidad.</a:t>
+            </a:r>
+            <a:endParaRPr lang="es-CO" sz="3200" dirty="0">
+              <a:latin typeface="Ancizar Sans" panose="020B0602040300000003"/>
+            </a:endParaRPr>
           </a:p>
         </p:txBody>
       </p:sp>

</xml_diff>